<commit_message>
cleared 221 stuff from poster
</commit_message>
<xml_diff>
--- a/poster.pptx
+++ b/poster.pptx
@@ -3540,36 +3540,6 @@
           <a:chExt cx="0" cy="0"/>
         </a:xfrm>
       </p:grpSpPr>
-      <p:pic>
-        <p:nvPicPr>
-          <p:cNvPr id="95" name="Picture 94" descr="graph.jpg"/>
-          <p:cNvPicPr>
-            <a:picLocks noChangeAspect="1"/>
-          </p:cNvPicPr>
-          <p:nvPr/>
-        </p:nvPicPr>
-        <p:blipFill>
-          <a:blip r:embed="rId3">
-            <a:extLst>
-              <a:ext uri="{28A0092B-C50C-407E-A947-70E740481C1C}">
-                <a14:useLocalDpi xmlns:a14="http://schemas.microsoft.com/office/drawing/2010/main" val="0"/>
-              </a:ext>
-            </a:extLst>
-          </a:blip>
-          <a:stretch>
-            <a:fillRect/>
-          </a:stretch>
-        </p:blipFill>
-        <p:spPr>
-          <a:xfrm>
-            <a:off x="9276336" y="12611908"/>
-            <a:ext cx="8627740" cy="5689888"/>
-          </a:xfrm>
-          <a:prstGeom prst="rect">
-            <a:avLst/>
-          </a:prstGeom>
-        </p:spPr>
-      </p:pic>
       <p:sp>
         <p:nvSpPr>
           <p:cNvPr id="2" name="TextBox 1"/>
@@ -3579,7 +3549,7 @@
         <p:spPr>
           <a:xfrm>
             <a:off x="3890526" y="238676"/>
-            <a:ext cx="20356855" cy="1446550"/>
+            <a:ext cx="20354169" cy="1400383"/>
           </a:xfrm>
           <a:prstGeom prst="rect">
             <a:avLst/>
@@ -3597,7 +3567,7 @@
                 <a:latin typeface="Arial"/>
                 <a:cs typeface="Arial"/>
               </a:rPr>
-              <a:t>Extraction Based Text Summarization</a:t>
+              <a:t>Deep Learning for Program Generation</a:t>
             </a:r>
             <a:endParaRPr lang="en-US" sz="8500" b="1" dirty="0">
               <a:latin typeface="Arial"/>
@@ -3634,94 +3604,29 @@
               <a:rPr lang="en-US" sz="5200" dirty="0" smtClean="0">
                 <a:ea typeface="ＭＳ Ｐゴシック" charset="0"/>
               </a:rPr>
-              <a:t>Reginald Long, Michael </a:t>
-            </a:r>
-            <a:r>
-              <a:rPr lang="en-US" sz="5200" dirty="0" err="1" smtClean="0">
-                <a:ea typeface="ＭＳ Ｐゴシック" charset="0"/>
-              </a:rPr>
-              <a:t>Xie</a:t>
+              <a:t>Reginald </a:t>
             </a:r>
             <a:r>
               <a:rPr lang="en-US" sz="5200" dirty="0" smtClean="0">
                 <a:ea typeface="ＭＳ Ｐゴシック" charset="0"/>
               </a:rPr>
-              <a:t>, Helen Jiang</a:t>
+              <a:t>Long</a:t>
+            </a:r>
+            <a:r>
+              <a:rPr lang="en-US" sz="5200" dirty="0">
+                <a:ea typeface="ＭＳ Ｐゴシック" charset="0"/>
+              </a:rPr>
+              <a:t> </a:t>
+            </a:r>
+            <a:r>
+              <a:rPr lang="en-US" sz="5200" dirty="0" smtClean="0">
+                <a:ea typeface="ＭＳ Ｐゴシック" charset="0"/>
+              </a:rPr>
+              <a:t>and Colin Wei</a:t>
             </a:r>
             <a:endParaRPr lang="en-US" sz="5200" dirty="0">
               <a:ea typeface="ＭＳ Ｐゴシック" charset="0"/>
             </a:endParaRPr>
-          </a:p>
-        </p:txBody>
-      </p:sp>
-      <p:sp>
-        <p:nvSpPr>
-          <p:cNvPr id="17" name="Rectangle 16"/>
-          <p:cNvSpPr/>
-          <p:nvPr/>
-        </p:nvSpPr>
-        <p:spPr>
-          <a:xfrm>
-            <a:off x="199236" y="14242737"/>
-            <a:ext cx="7844097" cy="3600986"/>
-          </a:xfrm>
-          <a:prstGeom prst="rect">
-            <a:avLst/>
-          </a:prstGeom>
-        </p:spPr>
-        <p:txBody>
-          <a:bodyPr wrap="square">
-            <a:spAutoFit/>
-          </a:bodyPr>
-          <a:lstStyle/>
-          <a:p>
-            <a:r>
-              <a:rPr lang="en-US" sz="3800" dirty="0" smtClean="0">
-                <a:latin typeface="Times New Roman"/>
-                <a:cs typeface="Times New Roman"/>
-              </a:rPr>
-              <a:t>We define examples as sentences and batches of examples as documents.</a:t>
-            </a:r>
-          </a:p>
-          <a:p>
-            <a:pPr marL="571500" indent="-571500">
-              <a:buFontTx/>
-              <a:buChar char="-"/>
-            </a:pPr>
-            <a:r>
-              <a:rPr lang="en-US" sz="3800" i="1" dirty="0" smtClean="0">
-                <a:latin typeface="Times New Roman"/>
-                <a:cs typeface="Times New Roman"/>
-              </a:rPr>
-              <a:t>Input: </a:t>
-            </a:r>
-            <a:r>
-              <a:rPr lang="en-US" sz="3800" dirty="0" smtClean="0">
-                <a:latin typeface="Times New Roman"/>
-                <a:cs typeface="Times New Roman"/>
-              </a:rPr>
-              <a:t>tuple containing a document and the # of sentences to extract</a:t>
-            </a:r>
-          </a:p>
-          <a:p>
-            <a:pPr marL="571500" indent="-571500">
-              <a:buFontTx/>
-              <a:buChar char="-"/>
-            </a:pPr>
-            <a:r>
-              <a:rPr lang="en-US" sz="3800" i="1" dirty="0" smtClean="0">
-                <a:latin typeface="Times New Roman"/>
-                <a:cs typeface="Times New Roman"/>
-              </a:rPr>
-              <a:t>Output: </a:t>
-            </a:r>
-            <a:r>
-              <a:rPr lang="en-US" sz="3800" dirty="0" smtClean="0">
-                <a:latin typeface="Times New Roman"/>
-                <a:cs typeface="Times New Roman"/>
-              </a:rPr>
-              <a:t>the set of important sentences in the document</a:t>
-            </a:r>
           </a:p>
         </p:txBody>
       </p:sp>
@@ -3734,7 +3639,7 @@
           <p:nvPr/>
         </p:nvPicPr>
         <p:blipFill>
-          <a:blip r:embed="rId4">
+          <a:blip r:embed="rId3">
             <a:extLst>
               <a:ext uri="{28A0092B-C50C-407E-A947-70E740481C1C}">
                 <a14:useLocalDpi xmlns:a14="http://schemas.microsoft.com/office/drawing/2010/main" val="0"/>
@@ -3764,7 +3669,7 @@
         <p:spPr>
           <a:xfrm>
             <a:off x="14163633" y="3979002"/>
-            <a:ext cx="4718493" cy="1261884"/>
+            <a:ext cx="4718493" cy="677108"/>
           </a:xfrm>
           <a:prstGeom prst="rect">
             <a:avLst/>
@@ -3777,13 +3682,6 @@
           </a:bodyPr>
           <a:lstStyle/>
           <a:p>
-            <a:r>
-              <a:rPr lang="en-US" sz="3800" dirty="0" smtClean="0">
-                <a:latin typeface="Times New Roman"/>
-                <a:cs typeface="Times New Roman"/>
-              </a:rPr>
-              <a:t>Remove Stop Words from each document</a:t>
-            </a:r>
             <a:endParaRPr lang="en-US" sz="3800" dirty="0">
               <a:latin typeface="Times New Roman"/>
               <a:cs typeface="Times New Roman"/>
@@ -3791,83 +3689,6 @@
           </a:p>
         </p:txBody>
       </p:sp>
-      <p:cxnSp>
-        <p:nvCxnSpPr>
-          <p:cNvPr id="30" name="Straight Arrow Connector 29"/>
-          <p:cNvCxnSpPr>
-            <a:stCxn id="40" idx="3"/>
-            <a:endCxn id="27" idx="1"/>
-          </p:cNvCxnSpPr>
-          <p:nvPr/>
-        </p:nvCxnSpPr>
-        <p:spPr>
-          <a:xfrm flipV="1">
-            <a:off x="12364244" y="4609944"/>
-            <a:ext cx="1799389" cy="821197"/>
-          </a:xfrm>
-          <a:prstGeom prst="straightConnector1">
-            <a:avLst/>
-          </a:prstGeom>
-          <a:ln>
-            <a:solidFill>
-              <a:schemeClr val="tx1"/>
-            </a:solidFill>
-            <a:tailEnd type="arrow"/>
-          </a:ln>
-        </p:spPr>
-        <p:style>
-          <a:lnRef idx="2">
-            <a:schemeClr val="accent1"/>
-          </a:lnRef>
-          <a:fillRef idx="0">
-            <a:schemeClr val="accent1"/>
-          </a:fillRef>
-          <a:effectRef idx="1">
-            <a:schemeClr val="accent1"/>
-          </a:effectRef>
-          <a:fontRef idx="minor">
-            <a:schemeClr val="tx1"/>
-          </a:fontRef>
-        </p:style>
-      </p:cxnSp>
-      <p:cxnSp>
-        <p:nvCxnSpPr>
-          <p:cNvPr id="32" name="Straight Arrow Connector 31"/>
-          <p:cNvCxnSpPr>
-            <a:stCxn id="40" idx="3"/>
-          </p:cNvCxnSpPr>
-          <p:nvPr/>
-        </p:nvCxnSpPr>
-        <p:spPr>
-          <a:xfrm>
-            <a:off x="12364244" y="5431141"/>
-            <a:ext cx="1704710" cy="842073"/>
-          </a:xfrm>
-          <a:prstGeom prst="straightConnector1">
-            <a:avLst/>
-          </a:prstGeom>
-          <a:ln>
-            <a:solidFill>
-              <a:schemeClr val="tx1"/>
-            </a:solidFill>
-            <a:tailEnd type="arrow"/>
-          </a:ln>
-        </p:spPr>
-        <p:style>
-          <a:lnRef idx="2">
-            <a:schemeClr val="accent1"/>
-          </a:lnRef>
-          <a:fillRef idx="0">
-            <a:schemeClr val="accent1"/>
-          </a:fillRef>
-          <a:effectRef idx="1">
-            <a:schemeClr val="accent1"/>
-          </a:effectRef>
-          <a:fontRef idx="minor">
-            <a:schemeClr val="tx1"/>
-          </a:fontRef>
-        </p:style>
-      </p:cxnSp>
       <p:sp>
         <p:nvSpPr>
           <p:cNvPr id="38" name="Rectangle 37"/>
@@ -3877,7 +3698,7 @@
         <p:spPr>
           <a:xfrm>
             <a:off x="8297335" y="3981479"/>
-            <a:ext cx="3744798" cy="738664"/>
+            <a:ext cx="184666" cy="738664"/>
           </a:xfrm>
           <a:prstGeom prst="rect">
             <a:avLst/>
@@ -3889,26 +3710,23 @@
           </a:bodyPr>
           <a:lstStyle/>
           <a:p>
-            <a:r>
-              <a:rPr lang="en-US" sz="4200" dirty="0" smtClean="0">
-                <a:latin typeface="Times New Roman"/>
-                <a:cs typeface="Times New Roman"/>
-              </a:rPr>
-              <a:t>(1) Load Corpus</a:t>
-            </a:r>
-          </a:p>
-        </p:txBody>
-      </p:sp>
-      <p:sp>
-        <p:nvSpPr>
-          <p:cNvPr id="40" name="Rectangle 39"/>
+            <a:endParaRPr lang="en-US" sz="4200" dirty="0" smtClean="0">
+              <a:latin typeface="Times New Roman"/>
+              <a:cs typeface="Times New Roman"/>
+            </a:endParaRPr>
+          </a:p>
+        </p:txBody>
+      </p:sp>
+      <p:sp>
+        <p:nvSpPr>
+          <p:cNvPr id="41" name="Rectangle 40"/>
           <p:cNvSpPr/>
           <p:nvPr/>
         </p:nvSpPr>
         <p:spPr>
           <a:xfrm>
-            <a:off x="8297335" y="5054114"/>
-            <a:ext cx="4066909" cy="754053"/>
+            <a:off x="14068954" y="5481254"/>
+            <a:ext cx="5071755" cy="677108"/>
           </a:xfrm>
           <a:prstGeom prst="rect">
             <a:avLst/>
@@ -3920,65 +3738,6 @@
           </a:bodyPr>
           <a:lstStyle/>
           <a:p>
-            <a:r>
-              <a:rPr lang="en-US" sz="4200" dirty="0" smtClean="0">
-                <a:latin typeface="Times New Roman"/>
-                <a:cs typeface="Times New Roman"/>
-              </a:rPr>
-              <a:t>(2) Preprocessing</a:t>
-            </a:r>
-          </a:p>
-        </p:txBody>
-      </p:sp>
-      <p:sp>
-        <p:nvSpPr>
-          <p:cNvPr id="41" name="Rectangle 40"/>
-          <p:cNvSpPr/>
-          <p:nvPr/>
-        </p:nvSpPr>
-        <p:spPr>
-          <a:xfrm>
-            <a:off x="14068954" y="5481254"/>
-            <a:ext cx="5071755" cy="1846659"/>
-          </a:xfrm>
-          <a:prstGeom prst="rect">
-            <a:avLst/>
-          </a:prstGeom>
-        </p:spPr>
-        <p:txBody>
-          <a:bodyPr wrap="square">
-            <a:spAutoFit/>
-          </a:bodyPr>
-          <a:lstStyle/>
-          <a:p>
-            <a:r>
-              <a:rPr lang="en-US" sz="3800" dirty="0" smtClean="0">
-                <a:latin typeface="Times New Roman"/>
-                <a:cs typeface="Times New Roman"/>
-              </a:rPr>
-              <a:t>Lemmatize the corpus using a </a:t>
-            </a:r>
-            <a:r>
-              <a:rPr lang="en-US" sz="3800" dirty="0" err="1" smtClean="0">
-                <a:latin typeface="Times New Roman"/>
-                <a:cs typeface="Times New Roman"/>
-              </a:rPr>
-              <a:t>wordnet</a:t>
-            </a:r>
-            <a:r>
-              <a:rPr lang="en-US" sz="3800" dirty="0" smtClean="0">
-                <a:latin typeface="Times New Roman"/>
-                <a:cs typeface="Times New Roman"/>
-              </a:rPr>
-              <a:t> </a:t>
-            </a:r>
-            <a:r>
-              <a:rPr lang="en-US" sz="3800" dirty="0" err="1" smtClean="0">
-                <a:latin typeface="Times New Roman"/>
-                <a:cs typeface="Times New Roman"/>
-              </a:rPr>
-              <a:t>lemmatizer</a:t>
-            </a:r>
             <a:endParaRPr lang="en-US" sz="3800" dirty="0">
               <a:latin typeface="Times New Roman"/>
               <a:cs typeface="Times New Roman"/>
@@ -3988,150 +3747,14 @@
       </p:sp>
       <p:sp>
         <p:nvSpPr>
-          <p:cNvPr id="42" name="Rectangle 41"/>
-          <p:cNvSpPr/>
+          <p:cNvPr id="61" name="TextBox 60"/>
+          <p:cNvSpPr txBox="1"/>
           <p:nvPr/>
         </p:nvSpPr>
         <p:spPr>
           <a:xfrm>
-            <a:off x="8297334" y="6129735"/>
-            <a:ext cx="11514665" cy="754053"/>
-          </a:xfrm>
-          <a:prstGeom prst="rect">
-            <a:avLst/>
-          </a:prstGeom>
-        </p:spPr>
-        <p:txBody>
-          <a:bodyPr wrap="square">
-            <a:spAutoFit/>
-          </a:bodyPr>
-          <a:lstStyle/>
-          <a:p>
-            <a:r>
-              <a:rPr lang="en-US" sz="4200" dirty="0" smtClean="0">
-                <a:latin typeface="Times New Roman"/>
-                <a:cs typeface="Times New Roman"/>
-              </a:rPr>
-              <a:t>(3) Label the data</a:t>
-            </a:r>
-            <a:endParaRPr lang="en-US" sz="4200" dirty="0">
-              <a:latin typeface="Times New Roman"/>
-              <a:cs typeface="Times New Roman"/>
-            </a:endParaRPr>
-          </a:p>
-        </p:txBody>
-      </p:sp>
-      <p:sp>
-        <p:nvSpPr>
-          <p:cNvPr id="43" name="Rectangle 42"/>
-          <p:cNvSpPr/>
-          <p:nvPr/>
-        </p:nvSpPr>
-        <p:spPr>
-          <a:xfrm>
-            <a:off x="8297336" y="7196543"/>
-            <a:ext cx="4578351" cy="754053"/>
-          </a:xfrm>
-          <a:prstGeom prst="rect">
-            <a:avLst/>
-          </a:prstGeom>
-        </p:spPr>
-        <p:txBody>
-          <a:bodyPr wrap="square">
-            <a:spAutoFit/>
-          </a:bodyPr>
-          <a:lstStyle/>
-          <a:p>
-            <a:r>
-              <a:rPr lang="en-US" sz="4200" dirty="0" smtClean="0">
-                <a:latin typeface="Times New Roman"/>
-                <a:cs typeface="Times New Roman"/>
-              </a:rPr>
-              <a:t>(4) Extract features:</a:t>
-            </a:r>
-          </a:p>
-        </p:txBody>
-      </p:sp>
-      <p:sp>
-        <p:nvSpPr>
-          <p:cNvPr id="44" name="Rectangle 43"/>
-          <p:cNvSpPr/>
-          <p:nvPr/>
-        </p:nvSpPr>
-        <p:spPr>
-          <a:xfrm>
-            <a:off x="8297331" y="8287294"/>
-            <a:ext cx="8413708" cy="754053"/>
-          </a:xfrm>
-          <a:prstGeom prst="rect">
-            <a:avLst/>
-          </a:prstGeom>
-        </p:spPr>
-        <p:txBody>
-          <a:bodyPr wrap="square">
-            <a:spAutoFit/>
-          </a:bodyPr>
-          <a:lstStyle/>
-          <a:p>
-            <a:r>
-              <a:rPr lang="en-US" sz="4200" dirty="0" smtClean="0">
-                <a:latin typeface="Times New Roman"/>
-                <a:cs typeface="Times New Roman"/>
-              </a:rPr>
-              <a:t>(5) Learn classifier</a:t>
-            </a:r>
-            <a:endParaRPr lang="en-US" sz="4200" dirty="0">
-              <a:latin typeface="Times New Roman"/>
-              <a:cs typeface="Times New Roman"/>
-            </a:endParaRPr>
-          </a:p>
-        </p:txBody>
-      </p:sp>
-      <p:sp>
-        <p:nvSpPr>
-          <p:cNvPr id="45" name="Rectangle 44"/>
-          <p:cNvSpPr/>
-          <p:nvPr/>
-        </p:nvSpPr>
-        <p:spPr>
-          <a:xfrm>
-            <a:off x="8297331" y="9302624"/>
-            <a:ext cx="5224888" cy="2031325"/>
-          </a:xfrm>
-          <a:prstGeom prst="rect">
-            <a:avLst/>
-          </a:prstGeom>
-        </p:spPr>
-        <p:txBody>
-          <a:bodyPr wrap="square">
-            <a:spAutoFit/>
-          </a:bodyPr>
-          <a:lstStyle/>
-          <a:p>
-            <a:r>
-              <a:rPr lang="en-US" sz="4200" dirty="0" smtClean="0">
-                <a:latin typeface="Times New Roman"/>
-                <a:cs typeface="Times New Roman"/>
-              </a:rPr>
-              <a:t>(6) Predict important sentences given an unseen document</a:t>
-            </a:r>
-            <a:endParaRPr lang="en-US" sz="4200" dirty="0">
-              <a:latin typeface="Times New Roman"/>
-              <a:cs typeface="Times New Roman"/>
-            </a:endParaRPr>
-          </a:p>
-        </p:txBody>
-      </p:sp>
-      <p:sp>
-        <p:nvSpPr>
-          <p:cNvPr id="58" name="TextBox 57"/>
-          <p:cNvSpPr txBox="1"/>
-          <p:nvPr/>
-        </p:nvSpPr>
-        <p:spPr>
-          <a:xfrm>
-            <a:off x="15168859" y="8130812"/>
-            <a:ext cx="3084360" cy="646331"/>
+            <a:off x="15168859" y="9819296"/>
+            <a:ext cx="4976982" cy="646331"/>
           </a:xfrm>
           <a:prstGeom prst="rect">
             <a:avLst/>
@@ -4144,318 +3767,10 @@
           </a:bodyPr>
           <a:lstStyle/>
           <a:p>
-            <a:r>
-              <a:rPr lang="en-US" sz="3600" dirty="0" smtClean="0">
-                <a:latin typeface="Times New Roman"/>
-                <a:cs typeface="Times New Roman"/>
-              </a:rPr>
-              <a:t>Word Count</a:t>
-            </a:r>
             <a:endParaRPr lang="en-US" sz="3600" dirty="0">
               <a:latin typeface="Times New Roman"/>
               <a:cs typeface="Times New Roman"/>
             </a:endParaRPr>
-          </a:p>
-        </p:txBody>
-      </p:sp>
-      <p:sp>
-        <p:nvSpPr>
-          <p:cNvPr id="59" name="TextBox 58"/>
-          <p:cNvSpPr txBox="1"/>
-          <p:nvPr/>
-        </p:nvSpPr>
-        <p:spPr>
-          <a:xfrm>
-            <a:off x="15168859" y="7273488"/>
-            <a:ext cx="3356045" cy="677108"/>
-          </a:xfrm>
-          <a:prstGeom prst="rect">
-            <a:avLst/>
-          </a:prstGeom>
-          <a:noFill/>
-        </p:spPr>
-        <p:txBody>
-          <a:bodyPr wrap="square" rtlCol="0">
-            <a:spAutoFit/>
-          </a:bodyPr>
-          <a:lstStyle/>
-          <a:p>
-            <a:r>
-              <a:rPr lang="en-US" sz="3800" dirty="0" smtClean="0">
-                <a:latin typeface="Times New Roman"/>
-                <a:cs typeface="Times New Roman"/>
-              </a:rPr>
-              <a:t>Part of Speech</a:t>
-            </a:r>
-          </a:p>
-        </p:txBody>
-      </p:sp>
-      <p:sp>
-        <p:nvSpPr>
-          <p:cNvPr id="60" name="TextBox 59"/>
-          <p:cNvSpPr txBox="1"/>
-          <p:nvPr/>
-        </p:nvSpPr>
-        <p:spPr>
-          <a:xfrm>
-            <a:off x="15187267" y="8968936"/>
-            <a:ext cx="4718493" cy="646331"/>
-          </a:xfrm>
-          <a:prstGeom prst="rect">
-            <a:avLst/>
-          </a:prstGeom>
-          <a:noFill/>
-        </p:spPr>
-        <p:txBody>
-          <a:bodyPr wrap="square" rtlCol="0">
-            <a:spAutoFit/>
-          </a:bodyPr>
-          <a:lstStyle/>
-          <a:p>
-            <a:r>
-              <a:rPr lang="en-US" sz="3600" dirty="0" smtClean="0">
-                <a:latin typeface="Times New Roman"/>
-                <a:cs typeface="Times New Roman"/>
-              </a:rPr>
-              <a:t>Sentence Location</a:t>
-            </a:r>
-            <a:endParaRPr lang="en-US" sz="3600" dirty="0">
-              <a:latin typeface="Times New Roman"/>
-              <a:cs typeface="Times New Roman"/>
-            </a:endParaRPr>
-          </a:p>
-        </p:txBody>
-      </p:sp>
-      <p:sp>
-        <p:nvSpPr>
-          <p:cNvPr id="61" name="TextBox 60"/>
-          <p:cNvSpPr txBox="1"/>
-          <p:nvPr/>
-        </p:nvSpPr>
-        <p:spPr>
-          <a:xfrm>
-            <a:off x="15168859" y="9819296"/>
-            <a:ext cx="4976982" cy="1200329"/>
-          </a:xfrm>
-          <a:prstGeom prst="rect">
-            <a:avLst/>
-          </a:prstGeom>
-          <a:noFill/>
-        </p:spPr>
-        <p:txBody>
-          <a:bodyPr wrap="square" rtlCol="0">
-            <a:spAutoFit/>
-          </a:bodyPr>
-          <a:lstStyle/>
-          <a:p>
-            <a:r>
-              <a:rPr lang="en-US" sz="3600" dirty="0" smtClean="0">
-                <a:latin typeface="Times New Roman"/>
-                <a:cs typeface="Times New Roman"/>
-              </a:rPr>
-              <a:t>Presence of high-frequency word</a:t>
-            </a:r>
-            <a:endParaRPr lang="en-US" sz="3600" dirty="0">
-              <a:latin typeface="Times New Roman"/>
-              <a:cs typeface="Times New Roman"/>
-            </a:endParaRPr>
-          </a:p>
-        </p:txBody>
-      </p:sp>
-      <p:cxnSp>
-        <p:nvCxnSpPr>
-          <p:cNvPr id="63" name="Straight Arrow Connector 62"/>
-          <p:cNvCxnSpPr>
-            <a:stCxn id="43" idx="3"/>
-            <a:endCxn id="58" idx="1"/>
-          </p:cNvCxnSpPr>
-          <p:nvPr/>
-        </p:nvCxnSpPr>
-        <p:spPr>
-          <a:xfrm>
-            <a:off x="12875687" y="7573570"/>
-            <a:ext cx="2293172" cy="880408"/>
-          </a:xfrm>
-          <a:prstGeom prst="straightConnector1">
-            <a:avLst/>
-          </a:prstGeom>
-          <a:ln>
-            <a:solidFill>
-              <a:srgbClr val="000000"/>
-            </a:solidFill>
-            <a:tailEnd type="arrow"/>
-          </a:ln>
-        </p:spPr>
-        <p:style>
-          <a:lnRef idx="2">
-            <a:schemeClr val="accent1"/>
-          </a:lnRef>
-          <a:fillRef idx="0">
-            <a:schemeClr val="accent1"/>
-          </a:fillRef>
-          <a:effectRef idx="1">
-            <a:schemeClr val="accent1"/>
-          </a:effectRef>
-          <a:fontRef idx="minor">
-            <a:schemeClr val="tx1"/>
-          </a:fontRef>
-        </p:style>
-      </p:cxnSp>
-      <p:cxnSp>
-        <p:nvCxnSpPr>
-          <p:cNvPr id="67" name="Straight Arrow Connector 66"/>
-          <p:cNvCxnSpPr>
-            <a:stCxn id="43" idx="3"/>
-            <a:endCxn id="59" idx="1"/>
-          </p:cNvCxnSpPr>
-          <p:nvPr/>
-        </p:nvCxnSpPr>
-        <p:spPr>
-          <a:xfrm>
-            <a:off x="12875687" y="7573570"/>
-            <a:ext cx="2293172" cy="38472"/>
-          </a:xfrm>
-          <a:prstGeom prst="straightConnector1">
-            <a:avLst/>
-          </a:prstGeom>
-          <a:ln>
-            <a:solidFill>
-              <a:srgbClr val="000000"/>
-            </a:solidFill>
-            <a:tailEnd type="arrow"/>
-          </a:ln>
-        </p:spPr>
-        <p:style>
-          <a:lnRef idx="2">
-            <a:schemeClr val="accent1"/>
-          </a:lnRef>
-          <a:fillRef idx="0">
-            <a:schemeClr val="accent1"/>
-          </a:fillRef>
-          <a:effectRef idx="1">
-            <a:schemeClr val="accent1"/>
-          </a:effectRef>
-          <a:fontRef idx="minor">
-            <a:schemeClr val="tx1"/>
-          </a:fontRef>
-        </p:style>
-      </p:cxnSp>
-      <p:cxnSp>
-        <p:nvCxnSpPr>
-          <p:cNvPr id="70" name="Straight Arrow Connector 69"/>
-          <p:cNvCxnSpPr>
-            <a:stCxn id="43" idx="3"/>
-            <a:endCxn id="60" idx="1"/>
-          </p:cNvCxnSpPr>
-          <p:nvPr/>
-        </p:nvCxnSpPr>
-        <p:spPr>
-          <a:xfrm>
-            <a:off x="12875687" y="7573570"/>
-            <a:ext cx="2311580" cy="1718532"/>
-          </a:xfrm>
-          <a:prstGeom prst="straightConnector1">
-            <a:avLst/>
-          </a:prstGeom>
-          <a:ln>
-            <a:solidFill>
-              <a:srgbClr val="000000"/>
-            </a:solidFill>
-            <a:tailEnd type="arrow"/>
-          </a:ln>
-        </p:spPr>
-        <p:style>
-          <a:lnRef idx="2">
-            <a:schemeClr val="accent1"/>
-          </a:lnRef>
-          <a:fillRef idx="0">
-            <a:schemeClr val="accent1"/>
-          </a:fillRef>
-          <a:effectRef idx="1">
-            <a:schemeClr val="accent1"/>
-          </a:effectRef>
-          <a:fontRef idx="minor">
-            <a:schemeClr val="tx1"/>
-          </a:fontRef>
-        </p:style>
-      </p:cxnSp>
-      <p:cxnSp>
-        <p:nvCxnSpPr>
-          <p:cNvPr id="73" name="Straight Arrow Connector 72"/>
-          <p:cNvCxnSpPr>
-            <a:stCxn id="43" idx="3"/>
-            <a:endCxn id="61" idx="1"/>
-          </p:cNvCxnSpPr>
-          <p:nvPr/>
-        </p:nvCxnSpPr>
-        <p:spPr>
-          <a:xfrm>
-            <a:off x="12875687" y="7573570"/>
-            <a:ext cx="2293172" cy="2845891"/>
-          </a:xfrm>
-          <a:prstGeom prst="straightConnector1">
-            <a:avLst/>
-          </a:prstGeom>
-          <a:ln>
-            <a:solidFill>
-              <a:srgbClr val="000000"/>
-            </a:solidFill>
-            <a:tailEnd type="arrow"/>
-          </a:ln>
-        </p:spPr>
-        <p:style>
-          <a:lnRef idx="2">
-            <a:schemeClr val="accent1"/>
-          </a:lnRef>
-          <a:fillRef idx="0">
-            <a:schemeClr val="accent1"/>
-          </a:fillRef>
-          <a:effectRef idx="1">
-            <a:schemeClr val="accent1"/>
-          </a:effectRef>
-          <a:fontRef idx="minor">
-            <a:schemeClr val="tx1"/>
-          </a:fontRef>
-        </p:style>
-      </p:cxnSp>
-      <p:sp>
-        <p:nvSpPr>
-          <p:cNvPr id="75" name="Rectangle 74"/>
-          <p:cNvSpPr/>
-          <p:nvPr/>
-        </p:nvSpPr>
-        <p:spPr>
-          <a:xfrm>
-            <a:off x="243031" y="7699856"/>
-            <a:ext cx="7503289" cy="5355313"/>
-          </a:xfrm>
-          <a:prstGeom prst="rect">
-            <a:avLst/>
-          </a:prstGeom>
-        </p:spPr>
-        <p:txBody>
-          <a:bodyPr wrap="square">
-            <a:spAutoFit/>
-          </a:bodyPr>
-          <a:lstStyle/>
-          <a:p>
-            <a:r>
-              <a:rPr lang="en-US" sz="3800" dirty="0" smtClean="0">
-                <a:latin typeface="Times New Roman"/>
-                <a:cs typeface="Times New Roman"/>
-              </a:rPr>
-              <a:t>    Most knowledge is stored in a textual format, but it is impossible for a person to absorb most of this knowledge due to the text’s length, redundancy, and complexity. </a:t>
-            </a:r>
-          </a:p>
-          <a:p>
-            <a:r>
-              <a:rPr lang="en-US" sz="3800" dirty="0" smtClean="0">
-                <a:latin typeface="Times New Roman"/>
-                <a:cs typeface="Times New Roman"/>
-                <a:sym typeface="Wingdings"/>
-              </a:rPr>
-              <a:t>    Automatic summarizers help distill the most important knowledge without needing to spend as much human power.</a:t>
-            </a:r>
           </a:p>
         </p:txBody>
       </p:sp>
@@ -4527,42 +3842,6 @@
             <a:endParaRPr lang="en-US" sz="4300" b="1" dirty="0">
               <a:latin typeface="Arial"/>
               <a:cs typeface="Arial"/>
-            </a:endParaRPr>
-          </a:p>
-        </p:txBody>
-      </p:sp>
-      <p:sp>
-        <p:nvSpPr>
-          <p:cNvPr id="79" name="TextBox 78"/>
-          <p:cNvSpPr txBox="1"/>
-          <p:nvPr/>
-        </p:nvSpPr>
-        <p:spPr>
-          <a:xfrm>
-            <a:off x="168649" y="4720143"/>
-            <a:ext cx="7493005" cy="1846659"/>
-          </a:xfrm>
-          <a:prstGeom prst="rect">
-            <a:avLst/>
-          </a:prstGeom>
-          <a:noFill/>
-        </p:spPr>
-        <p:txBody>
-          <a:bodyPr wrap="square" rtlCol="0">
-            <a:spAutoFit/>
-          </a:bodyPr>
-          <a:lstStyle/>
-          <a:p>
-            <a:r>
-              <a:rPr lang="en-US" sz="3800" dirty="0" smtClean="0">
-                <a:latin typeface="Times New Roman"/>
-                <a:cs typeface="Times New Roman"/>
-              </a:rPr>
-              <a:t>Given a document, summarize it by extracting the most important sentences. </a:t>
-            </a:r>
-            <a:endParaRPr lang="en-US" sz="3800" dirty="0">
-              <a:latin typeface="Times New Roman"/>
-              <a:cs typeface="Times New Roman"/>
             </a:endParaRPr>
           </a:p>
         </p:txBody>
@@ -4814,211 +4093,6 @@
             <a:endParaRPr lang="en-US" b="1" dirty="0">
               <a:latin typeface="Arial" charset="0"/>
             </a:endParaRPr>
-          </a:p>
-        </p:txBody>
-      </p:sp>
-      <p:sp>
-        <p:nvSpPr>
-          <p:cNvPr id="87" name="TextBox 86"/>
-          <p:cNvSpPr txBox="1"/>
-          <p:nvPr/>
-        </p:nvSpPr>
-        <p:spPr>
-          <a:xfrm>
-            <a:off x="19248065" y="14856346"/>
-            <a:ext cx="7832351" cy="3016210"/>
-          </a:xfrm>
-          <a:prstGeom prst="rect">
-            <a:avLst/>
-          </a:prstGeom>
-          <a:noFill/>
-        </p:spPr>
-        <p:txBody>
-          <a:bodyPr wrap="square" rtlCol="0">
-            <a:spAutoFit/>
-          </a:bodyPr>
-          <a:lstStyle/>
-          <a:p>
-            <a:pPr marL="571500" indent="-571500">
-              <a:buFontTx/>
-              <a:buChar char="-"/>
-            </a:pPr>
-            <a:r>
-              <a:rPr lang="en-US" sz="3800" dirty="0" smtClean="0">
-                <a:latin typeface="Times New Roman"/>
-                <a:cs typeface="Times New Roman"/>
-              </a:rPr>
-              <a:t>Importance varies &amp; is context-dependent,</a:t>
-            </a:r>
-            <a:r>
-              <a:rPr lang="en-US" sz="3800" dirty="0">
-                <a:latin typeface="Times New Roman"/>
-                <a:cs typeface="Times New Roman"/>
-              </a:rPr>
-              <a:t> </a:t>
-            </a:r>
-            <a:r>
-              <a:rPr lang="en-US" sz="3800" dirty="0" smtClean="0">
-                <a:latin typeface="Times New Roman"/>
-                <a:cs typeface="Times New Roman"/>
-              </a:rPr>
-              <a:t>hard to generalize</a:t>
-            </a:r>
-          </a:p>
-          <a:p>
-            <a:pPr marL="571500" indent="-571500">
-              <a:buFontTx/>
-              <a:buChar char="-"/>
-            </a:pPr>
-            <a:r>
-              <a:rPr lang="en-US" sz="3800" dirty="0" smtClean="0">
-                <a:latin typeface="Times New Roman"/>
-                <a:cs typeface="Times New Roman"/>
-              </a:rPr>
-              <a:t>High subjectivity</a:t>
-            </a:r>
-          </a:p>
-          <a:p>
-            <a:pPr marL="571500" indent="-571500">
-              <a:buFontTx/>
-              <a:buChar char="-"/>
-            </a:pPr>
-            <a:r>
-              <a:rPr lang="en-US" sz="3800" dirty="0" smtClean="0">
-                <a:latin typeface="Times New Roman"/>
-                <a:cs typeface="Times New Roman"/>
-              </a:rPr>
-              <a:t>Asymmetry between important and non-important sentences</a:t>
-            </a:r>
-            <a:endParaRPr lang="en-US" sz="3800" dirty="0">
-              <a:latin typeface="Times New Roman"/>
-              <a:cs typeface="Times New Roman"/>
-            </a:endParaRPr>
-          </a:p>
-        </p:txBody>
-      </p:sp>
-      <p:sp>
-        <p:nvSpPr>
-          <p:cNvPr id="97" name="TextBox 96"/>
-          <p:cNvSpPr txBox="1"/>
-          <p:nvPr/>
-        </p:nvSpPr>
-        <p:spPr>
-          <a:xfrm>
-            <a:off x="19293665" y="3759413"/>
-            <a:ext cx="8104526" cy="9941183"/>
-          </a:xfrm>
-          <a:prstGeom prst="rect">
-            <a:avLst/>
-          </a:prstGeom>
-          <a:noFill/>
-        </p:spPr>
-        <p:txBody>
-          <a:bodyPr wrap="square" rtlCol="0">
-            <a:spAutoFit/>
-          </a:bodyPr>
-          <a:lstStyle/>
-          <a:p>
-            <a:pPr marL="571500" indent="-571500">
-              <a:buFontTx/>
-              <a:buChar char="-"/>
-            </a:pPr>
-            <a:r>
-              <a:rPr lang="en-US" sz="4000" dirty="0" smtClean="0">
-                <a:latin typeface="Times New Roman"/>
-                <a:cs typeface="Times New Roman"/>
-              </a:rPr>
-              <a:t>The oracle performed poorly, implying that summarization is an inherently hard problem</a:t>
-            </a:r>
-            <a:endParaRPr lang="en-US" sz="4000" dirty="0">
-              <a:latin typeface="Times New Roman"/>
-              <a:cs typeface="Times New Roman"/>
-            </a:endParaRPr>
-          </a:p>
-          <a:p>
-            <a:pPr marL="571500" indent="-571500">
-              <a:buFontTx/>
-              <a:buChar char="-"/>
-            </a:pPr>
-            <a:r>
-              <a:rPr lang="en-US" sz="4000" dirty="0" smtClean="0">
-                <a:latin typeface="Times New Roman"/>
-                <a:cs typeface="Times New Roman"/>
-              </a:rPr>
-              <a:t>We improved baseline by changing our model from a holistic approach where we summarize one document at a time to one where we take context into account</a:t>
-            </a:r>
-          </a:p>
-          <a:p>
-            <a:pPr marL="571500" indent="-571500">
-              <a:buFontTx/>
-              <a:buChar char="-"/>
-            </a:pPr>
-            <a:r>
-              <a:rPr lang="en-US" sz="4000" dirty="0" smtClean="0">
-                <a:latin typeface="Times New Roman"/>
-                <a:cs typeface="Times New Roman"/>
-              </a:rPr>
-              <a:t>Training data precision ranged from 20-50%, </a:t>
-            </a:r>
-            <a:r>
-              <a:rPr lang="en-US" sz="4000" dirty="0">
-                <a:latin typeface="Times New Roman"/>
-                <a:cs typeface="Times New Roman"/>
-              </a:rPr>
-              <a:t>r</a:t>
-            </a:r>
-            <a:r>
-              <a:rPr lang="en-US" sz="4000" dirty="0" smtClean="0">
-                <a:latin typeface="Times New Roman"/>
-                <a:cs typeface="Times New Roman"/>
-              </a:rPr>
-              <a:t>ecall ranged from  30-70% </a:t>
-            </a:r>
-            <a:r>
-              <a:rPr lang="en-US" sz="4000" dirty="0" smtClean="0">
-                <a:latin typeface="Times New Roman"/>
-                <a:cs typeface="Times New Roman"/>
-                <a:sym typeface="Wingdings"/>
-              </a:rPr>
-              <a:t> data has high variance</a:t>
-            </a:r>
-            <a:endParaRPr lang="en-US" sz="4000" dirty="0" smtClean="0">
-              <a:latin typeface="Times New Roman"/>
-              <a:cs typeface="Times New Roman"/>
-            </a:endParaRPr>
-          </a:p>
-          <a:p>
-            <a:pPr marL="571500" indent="-571500">
-              <a:buFontTx/>
-              <a:buChar char="-"/>
-            </a:pPr>
-            <a:r>
-              <a:rPr lang="en-US" sz="4000" dirty="0">
-                <a:latin typeface="Times New Roman"/>
-                <a:cs typeface="Times New Roman"/>
-              </a:rPr>
-              <a:t>C</a:t>
-            </a:r>
-            <a:r>
-              <a:rPr lang="en-US" sz="4000" dirty="0" smtClean="0">
-                <a:latin typeface="Times New Roman"/>
-                <a:cs typeface="Times New Roman"/>
-              </a:rPr>
-              <a:t>lassifiers mostly had high training accuracy on low # of documents</a:t>
-            </a:r>
-          </a:p>
-          <a:p>
-            <a:pPr marL="571500" indent="-571500">
-              <a:buFontTx/>
-              <a:buChar char="-"/>
-            </a:pPr>
-            <a:r>
-              <a:rPr lang="en-US" sz="4000" dirty="0" smtClean="0">
-                <a:latin typeface="Times New Roman"/>
-                <a:cs typeface="Times New Roman"/>
-              </a:rPr>
-              <a:t>Training performance degrades with more training documents, so training data has high variance</a:t>
-            </a:r>
           </a:p>
         </p:txBody>
       </p:sp>

</xml_diff>

<commit_message>
Finished poster for real this time though
</commit_message>
<xml_diff>
--- a/poster.pptx
+++ b/poster.pptx
@@ -3812,7 +3812,7 @@
         </p:nvSpPr>
         <p:spPr>
           <a:xfrm>
-            <a:off x="167187" y="10842653"/>
+            <a:off x="167187" y="10465626"/>
             <a:ext cx="4749605" cy="754053"/>
           </a:xfrm>
           <a:prstGeom prst="rect">
@@ -4343,11 +4343,7 @@
                       <a:pPr algn="l"/>
                       <a:r>
                         <a:rPr lang="en-US" sz="3200" dirty="0" smtClean="0"/>
-                        <a:t>Baseline (</a:t>
-                      </a:r>
-                      <a:r>
-                        <a:rPr lang="en-US" sz="3200" dirty="0" smtClean="0"/>
-                        <a:t>1</a:t>
+                        <a:t>Baseline (1</a:t>
                       </a:r>
                       <a:r>
                         <a:rPr lang="en-US" sz="3200" baseline="0" dirty="0" smtClean="0"/>
@@ -4355,11 +4351,7 @@
                       </a:r>
                       <a:r>
                         <a:rPr lang="en-US" sz="3200" dirty="0" smtClean="0"/>
-                        <a:t>4 </a:t>
-                      </a:r>
-                      <a:r>
-                        <a:rPr lang="en-US" sz="3200" dirty="0" smtClean="0"/>
-                        <a:t>grams,</a:t>
+                        <a:t>4 grams,</a:t>
                       </a:r>
                       <a:r>
                         <a:rPr lang="en-US" sz="3200" baseline="0" dirty="0" smtClean="0"/>
@@ -4699,23 +4691,7 @@
           <a:p>
             <a:r>
               <a:rPr lang="en-US" sz="3200" dirty="0" smtClean="0"/>
-              <a:t>The popularity of simple, but powerful tools for data manipulation like Excel (vs. </a:t>
-            </a:r>
-            <a:r>
-              <a:rPr lang="en-US" sz="3200" dirty="0" smtClean="0"/>
-              <a:t>CSV manipulation using a programming language) </a:t>
-            </a:r>
-            <a:r>
-              <a:rPr lang="en-US" sz="3200" dirty="0" smtClean="0"/>
-              <a:t>show </a:t>
-            </a:r>
-            <a:r>
-              <a:rPr lang="en-US" sz="3200" dirty="0" smtClean="0"/>
-              <a:t>how the average person can reap the benefits of computation without knowing how to program. </a:t>
-            </a:r>
-            <a:r>
-              <a:rPr lang="en-US" sz="3200" dirty="0" smtClean="0"/>
-              <a:t>We attempt to take this idea one step </a:t>
+              <a:t>The popularity of simple, but powerful tools for data manipulation like Excel (vs. CSV manipulation using a programming language) show how the average person can reap the benefits of computation without knowing how to program. We attempt to take this idea one step </a:t>
             </a:r>
             <a:r>
               <a:rPr lang="en-US" sz="3200" dirty="0" err="1" smtClean="0"/>
@@ -4723,19 +4699,7 @@
             </a:r>
             <a:r>
               <a:rPr lang="en-US" sz="3200" dirty="0" smtClean="0"/>
-              <a:t> </a:t>
-            </a:r>
-            <a:r>
-              <a:rPr lang="en-US" sz="3200" dirty="0" smtClean="0"/>
-              <a:t>by allowing the user to specify </a:t>
-            </a:r>
-            <a:r>
-              <a:rPr lang="en-US" sz="3200" dirty="0" smtClean="0"/>
-              <a:t>generic programs </a:t>
-            </a:r>
-            <a:r>
-              <a:rPr lang="en-US" sz="3200" dirty="0" smtClean="0"/>
-              <a:t>in English.</a:t>
+              <a:t> by allowing the user to specify generic programs in English.</a:t>
             </a:r>
             <a:endParaRPr lang="en-US" sz="3200" dirty="0"/>
           </a:p>
@@ -4765,15 +4729,7 @@
           <a:p>
             <a:r>
               <a:rPr lang="en-US" sz="3600" dirty="0" smtClean="0"/>
-              <a:t>We use SEMPRE’s built-in semantic parser to generate potential candidate parses of an utterance. We take those parses, and then apply a neural network model to generate a ranking. Our evaluation metric is </a:t>
-            </a:r>
-            <a:r>
-              <a:rPr lang="en-US" sz="3600" dirty="0" smtClean="0"/>
-              <a:t>accuracy; a parse is correct if it is exactly the same as the oracle parse. </a:t>
-            </a:r>
-            <a:r>
-              <a:rPr lang="en-US" sz="3600" dirty="0" smtClean="0"/>
-              <a:t>We consider an utterance correctly parsed by the oracle if there exists a generated program that returns the annotated desired result.</a:t>
+              <a:t>We use SEMPRE’s built-in semantic parser to generate potential candidate parses of an utterance. We take those parses, and then apply a neural network model to generate a ranking. Our evaluation metric is accuracy; a parse is correct if it is exactly the same as the oracle parse. We consider an utterance correctly parsed by the oracle if there exists a generated program that returns the annotated desired result.</a:t>
             </a:r>
             <a:endParaRPr lang="en-US" sz="3600" dirty="0"/>
           </a:p>
@@ -4811,8 +4767,8 @@
         </p:nvSpPr>
         <p:spPr>
           <a:xfrm>
-            <a:off x="167187" y="11596706"/>
-            <a:ext cx="7277158" cy="6494085"/>
+            <a:off x="167186" y="11316199"/>
+            <a:ext cx="7573838" cy="6494085"/>
           </a:xfrm>
           <a:prstGeom prst="rect">
             <a:avLst/>
@@ -4827,7 +4783,23 @@
           <a:p>
             <a:r>
               <a:rPr lang="en-US" sz="3200" dirty="0" smtClean="0"/>
-              <a:t>Each program consists of an input and a command in English. Our training set has 6127 examples, and our </a:t>
+              <a:t>Each program consists of an input and a command in </a:t>
+            </a:r>
+            <a:r>
+              <a:rPr lang="en-US" sz="3200" dirty="0" smtClean="0"/>
+              <a:t>English (Ex: </a:t>
+            </a:r>
+            <a:r>
+              <a:rPr lang="en-US" sz="3200" dirty="0" err="1" smtClean="0"/>
+              <a:t>aa</a:t>
+            </a:r>
+            <a:r>
+              <a:rPr lang="en-US" sz="3200" dirty="0" smtClean="0"/>
+              <a:t> bb cc ||| add an a to the end of the last group). </a:t>
+            </a:r>
+            <a:r>
+              <a:rPr lang="en-US" sz="3200" dirty="0" smtClean="0"/>
+              <a:t>Our training set has 6127 examples, and our </a:t>
             </a:r>
             <a:r>
               <a:rPr lang="en-US" sz="3200" dirty="0" err="1" smtClean="0"/>
@@ -4835,11 +4807,7 @@
             </a:r>
             <a:r>
               <a:rPr lang="en-US" sz="3200" dirty="0" smtClean="0"/>
-              <a:t> has 681 examples. We </a:t>
-            </a:r>
-            <a:r>
-              <a:rPr lang="en-US" sz="3200" dirty="0" smtClean="0"/>
-              <a:t>train on utterances for the following string operations: </a:t>
+              <a:t> has 681 examples. We train on utterances for the following string operations: </a:t>
             </a:r>
           </a:p>
           <a:p>
@@ -4848,7 +4816,19 @@
             </a:pPr>
             <a:r>
               <a:rPr lang="en-US" sz="3200" dirty="0" smtClean="0"/>
-              <a:t>Prepending characters </a:t>
+              <a:t>{</a:t>
+            </a:r>
+            <a:r>
+              <a:rPr lang="en-US" sz="3200" dirty="0" err="1" smtClean="0"/>
+              <a:t>Pre|Ap</a:t>
+            </a:r>
+            <a:r>
+              <a:rPr lang="en-US" sz="3200" dirty="0" smtClean="0"/>
+              <a:t>}pending </a:t>
+            </a:r>
+            <a:r>
+              <a:rPr lang="en-US" sz="3200" dirty="0" smtClean="0"/>
+              <a:t>characters </a:t>
             </a:r>
           </a:p>
           <a:p>
@@ -4857,8 +4837,25 @@
             </a:pPr>
             <a:r>
               <a:rPr lang="en-US" sz="3200" dirty="0" smtClean="0"/>
-              <a:t>Appending characters</a:t>
-            </a:r>
+              <a:t>Removing </a:t>
+            </a:r>
+            <a:r>
+              <a:rPr lang="en-US" sz="3200" dirty="0" smtClean="0"/>
+              <a:t>characters from the </a:t>
+            </a:r>
+            <a:r>
+              <a:rPr lang="en-US" sz="3200" dirty="0" smtClean="0"/>
+              <a:t>{</a:t>
+            </a:r>
+            <a:r>
+              <a:rPr lang="en-US" sz="3200" dirty="0" err="1" smtClean="0"/>
+              <a:t>front|end</a:t>
+            </a:r>
+            <a:r>
+              <a:rPr lang="en-US" sz="3200" dirty="0" smtClean="0"/>
+              <a:t>}</a:t>
+            </a:r>
+            <a:endParaRPr lang="en-US" sz="3200" dirty="0" smtClean="0"/>
           </a:p>
           <a:p>
             <a:pPr marL="742950" indent="-742950">
@@ -4866,25 +4863,11 @@
             </a:pPr>
             <a:r>
               <a:rPr lang="en-US" sz="3200" dirty="0" smtClean="0"/>
-              <a:t>Removing characters from the front</a:t>
-            </a:r>
-          </a:p>
-          <a:p>
-            <a:pPr marL="742950" indent="-742950">
-              <a:buAutoNum type="arabicPeriod"/>
-            </a:pPr>
+              <a:t>Reversing </a:t>
+            </a:r>
             <a:r>
               <a:rPr lang="en-US" sz="3200" dirty="0" smtClean="0"/>
-              <a:t>Removing characters from the end</a:t>
-            </a:r>
-          </a:p>
-          <a:p>
-            <a:pPr marL="742950" indent="-742950">
-              <a:buAutoNum type="arabicPeriod"/>
-            </a:pPr>
-            <a:r>
-              <a:rPr lang="en-US" sz="3200" dirty="0" smtClean="0"/>
-              <a:t>Reversing a string</a:t>
+              <a:t>a string</a:t>
             </a:r>
           </a:p>
           <a:p>
@@ -4941,15 +4924,15 @@
           <a:p>
             <a:r>
               <a:rPr lang="en-US" sz="3600" dirty="0" smtClean="0"/>
-              <a:t>As expected, the recurrent neural network was our best </a:t>
+              <a:t>As expected, the recurrent neural network was our best model; however, every neural network model </a:t>
+            </a:r>
+            <a:r>
+              <a:rPr lang="en-US" sz="3600" smtClean="0"/>
+              <a:t>we tested outperformed </a:t>
             </a:r>
             <a:r>
               <a:rPr lang="en-US" sz="3600" dirty="0" smtClean="0"/>
-              <a:t>model; however, every neural network model outperformed the baseline. </a:t>
-            </a:r>
-            <a:r>
-              <a:rPr lang="en-US" sz="3600" dirty="0" smtClean="0"/>
-              <a:t>The biggest difference we found between the RNN and other models was that it was able to capture semantic meaning for word order – for the other models where we simply add word vectors, the “swap” command gets parsed inaccurately as either input order suffices.</a:t>
+              <a:t>the baseline. The biggest difference we found between the RNN and other models was that it was able to capture semantic meaning for word order – for the other models where we simply add word vectors, the “swap” command gets parsed inaccurately as either input order suffices.</a:t>
             </a:r>
             <a:endParaRPr lang="en-US" sz="3600" dirty="0"/>
           </a:p>

</xml_diff>